<commit_message>
Edited Report and PPT
</commit_message>
<xml_diff>
--- a/docs/Clg 1st review.pptx
+++ b/docs/Clg 1st review.pptx
@@ -211,7 +211,7 @@
           <a:p>
             <a:fld id="{C1BED7E8-5420-4F73-BA32-34A7030FE7D8}" type="datetimeFigureOut">
               <a:rPr lang="en-US" smtClean="0"/>
-              <a:t>2/17/2026</a:t>
+              <a:t>2/19/2026</a:t>
             </a:fld>
             <a:endParaRPr lang="en-US"/>
           </a:p>
@@ -1897,7 +1897,7 @@
           <a:p>
             <a:fld id="{C198EE3F-C531-4F47-81BE-EB7857D8F039}" type="datetimeFigureOut">
               <a:rPr lang="en-US" smtClean="0"/>
-              <a:t>2/17/2026</a:t>
+              <a:t>2/19/2026</a:t>
             </a:fld>
             <a:endParaRPr lang="en-US"/>
           </a:p>
@@ -2095,7 +2095,7 @@
           <a:p>
             <a:fld id="{C198EE3F-C531-4F47-81BE-EB7857D8F039}" type="datetimeFigureOut">
               <a:rPr lang="en-US" smtClean="0"/>
-              <a:t>2/17/2026</a:t>
+              <a:t>2/19/2026</a:t>
             </a:fld>
             <a:endParaRPr lang="en-US"/>
           </a:p>
@@ -2303,7 +2303,7 @@
           <a:p>
             <a:fld id="{C198EE3F-C531-4F47-81BE-EB7857D8F039}" type="datetimeFigureOut">
               <a:rPr lang="en-US" smtClean="0"/>
-              <a:t>2/17/2026</a:t>
+              <a:t>2/19/2026</a:t>
             </a:fld>
             <a:endParaRPr lang="en-US"/>
           </a:p>
@@ -2501,7 +2501,7 @@
           <a:p>
             <a:fld id="{C198EE3F-C531-4F47-81BE-EB7857D8F039}" type="datetimeFigureOut">
               <a:rPr lang="en-US" smtClean="0"/>
-              <a:t>2/17/2026</a:t>
+              <a:t>2/19/2026</a:t>
             </a:fld>
             <a:endParaRPr lang="en-US"/>
           </a:p>
@@ -2776,7 +2776,7 @@
           <a:p>
             <a:fld id="{C198EE3F-C531-4F47-81BE-EB7857D8F039}" type="datetimeFigureOut">
               <a:rPr lang="en-US" smtClean="0"/>
-              <a:t>2/17/2026</a:t>
+              <a:t>2/19/2026</a:t>
             </a:fld>
             <a:endParaRPr lang="en-US"/>
           </a:p>
@@ -3041,7 +3041,7 @@
           <a:p>
             <a:fld id="{C198EE3F-C531-4F47-81BE-EB7857D8F039}" type="datetimeFigureOut">
               <a:rPr lang="en-US" smtClean="0"/>
-              <a:t>2/17/2026</a:t>
+              <a:t>2/19/2026</a:t>
             </a:fld>
             <a:endParaRPr lang="en-US"/>
           </a:p>
@@ -3453,7 +3453,7 @@
           <a:p>
             <a:fld id="{C198EE3F-C531-4F47-81BE-EB7857D8F039}" type="datetimeFigureOut">
               <a:rPr lang="en-US" smtClean="0"/>
-              <a:t>2/17/2026</a:t>
+              <a:t>2/19/2026</a:t>
             </a:fld>
             <a:endParaRPr lang="en-US"/>
           </a:p>
@@ -3594,7 +3594,7 @@
           <a:p>
             <a:fld id="{C198EE3F-C531-4F47-81BE-EB7857D8F039}" type="datetimeFigureOut">
               <a:rPr lang="en-US" smtClean="0"/>
-              <a:t>2/17/2026</a:t>
+              <a:t>2/19/2026</a:t>
             </a:fld>
             <a:endParaRPr lang="en-US"/>
           </a:p>
@@ -3707,7 +3707,7 @@
           <a:p>
             <a:fld id="{C198EE3F-C531-4F47-81BE-EB7857D8F039}" type="datetimeFigureOut">
               <a:rPr lang="en-US" smtClean="0"/>
-              <a:t>2/17/2026</a:t>
+              <a:t>2/19/2026</a:t>
             </a:fld>
             <a:endParaRPr lang="en-US"/>
           </a:p>
@@ -4018,7 +4018,7 @@
           <a:p>
             <a:fld id="{C198EE3F-C531-4F47-81BE-EB7857D8F039}" type="datetimeFigureOut">
               <a:rPr lang="en-US" smtClean="0"/>
-              <a:t>2/17/2026</a:t>
+              <a:t>2/19/2026</a:t>
             </a:fld>
             <a:endParaRPr lang="en-US"/>
           </a:p>
@@ -4306,7 +4306,7 @@
           <a:p>
             <a:fld id="{C198EE3F-C531-4F47-81BE-EB7857D8F039}" type="datetimeFigureOut">
               <a:rPr lang="en-US" smtClean="0"/>
-              <a:t>2/17/2026</a:t>
+              <a:t>2/19/2026</a:t>
             </a:fld>
             <a:endParaRPr lang="en-US"/>
           </a:p>
@@ -4547,7 +4547,7 @@
           <a:p>
             <a:fld id="{C198EE3F-C531-4F47-81BE-EB7857D8F039}" type="datetimeFigureOut">
               <a:rPr lang="en-US" smtClean="0"/>
-              <a:t>2/17/2026</a:t>
+              <a:t>2/19/2026</a:t>
             </a:fld>
             <a:endParaRPr lang="en-US"/>
           </a:p>
@@ -5294,7 +5294,7 @@
           </a:bodyPr>
           <a:lstStyle/>
           <a:p>
-            <a:pPr marL="342900" indent="-342900">
+            <a:pPr marL="342900" indent="-342900" algn="just">
               <a:buFont typeface="Wingdings" panose="05000000000000000000" pitchFamily="2" charset="2"/>
               <a:buChar char="Ø"/>
             </a:pPr>
@@ -5307,7 +5307,7 @@
             </a:r>
           </a:p>
           <a:p>
-            <a:pPr marL="342900" indent="-342900">
+            <a:pPr marL="342900" indent="-342900" algn="just">
               <a:buFont typeface="Wingdings" panose="05000000000000000000" pitchFamily="2" charset="2"/>
               <a:buChar char="ü"/>
             </a:pPr>
@@ -5320,7 +5320,7 @@
             </a:r>
           </a:p>
           <a:p>
-            <a:pPr marL="342900" indent="-342900">
+            <a:pPr marL="342900" indent="-342900" algn="just">
               <a:buFont typeface="Wingdings" panose="05000000000000000000" pitchFamily="2" charset="2"/>
               <a:buChar char="ü"/>
             </a:pPr>
@@ -5330,7 +5330,7 @@
             </a:endParaRPr>
           </a:p>
           <a:p>
-            <a:pPr marL="342900" indent="-342900">
+            <a:pPr marL="342900" indent="-342900" algn="just">
               <a:buFont typeface="Wingdings" panose="05000000000000000000" pitchFamily="2" charset="2"/>
               <a:buChar char="ü"/>
             </a:pPr>
@@ -5343,7 +5343,7 @@
             </a:r>
           </a:p>
           <a:p>
-            <a:pPr marL="342900" indent="-342900">
+            <a:pPr marL="342900" indent="-342900" algn="just">
               <a:buFont typeface="Wingdings" panose="05000000000000000000" pitchFamily="2" charset="2"/>
               <a:buChar char="ü"/>
             </a:pPr>
@@ -5353,7 +5353,7 @@
             </a:endParaRPr>
           </a:p>
           <a:p>
-            <a:pPr marL="342900" indent="-342900">
+            <a:pPr marL="342900" indent="-342900" algn="just">
               <a:buFont typeface="Wingdings" panose="05000000000000000000" pitchFamily="2" charset="2"/>
               <a:buChar char="ü"/>
             </a:pPr>
@@ -5366,13 +5366,14 @@
             </a:r>
           </a:p>
           <a:p>
+            <a:pPr algn="just"/>
             <a:endParaRPr lang="en-US" sz="2000" b="1" dirty="0">
               <a:latin typeface="Times New Roman" panose="02020603050405020304" pitchFamily="18" charset="0"/>
               <a:cs typeface="Times New Roman" panose="02020603050405020304" pitchFamily="18" charset="0"/>
             </a:endParaRPr>
           </a:p>
           <a:p>
-            <a:pPr marL="342900" indent="-342900">
+            <a:pPr marL="342900" indent="-342900" algn="just">
               <a:buFont typeface="Wingdings" panose="05000000000000000000" pitchFamily="2" charset="2"/>
               <a:buChar char="Ø"/>
             </a:pPr>
@@ -5385,7 +5386,7 @@
             </a:r>
           </a:p>
           <a:p>
-            <a:pPr marL="342900" indent="-342900">
+            <a:pPr marL="342900" indent="-342900" algn="just">
               <a:buFont typeface="Wingdings" panose="05000000000000000000" pitchFamily="2" charset="2"/>
               <a:buChar char="ü"/>
             </a:pPr>
@@ -5398,7 +5399,7 @@
             </a:r>
           </a:p>
           <a:p>
-            <a:pPr marL="342900" indent="-342900">
+            <a:pPr marL="342900" indent="-342900" algn="just">
               <a:buFont typeface="Wingdings" panose="05000000000000000000" pitchFamily="2" charset="2"/>
               <a:buChar char="ü"/>
             </a:pPr>
@@ -5408,7 +5409,7 @@
             </a:endParaRPr>
           </a:p>
           <a:p>
-            <a:pPr marL="342900" indent="-342900">
+            <a:pPr marL="342900" indent="-342900" algn="just">
               <a:buFont typeface="Wingdings" panose="05000000000000000000" pitchFamily="2" charset="2"/>
               <a:buChar char="ü"/>
             </a:pPr>
@@ -5527,7 +5528,7 @@
           </a:bodyPr>
           <a:lstStyle/>
           <a:p>
-            <a:pPr marL="342900" indent="-342900">
+            <a:pPr marL="342900" indent="-342900" algn="just">
               <a:buFont typeface="Wingdings" panose="05000000000000000000" pitchFamily="2" charset="2"/>
               <a:buChar char="Ø"/>
             </a:pPr>
@@ -5540,7 +5541,7 @@
             </a:r>
           </a:p>
           <a:p>
-            <a:pPr marL="342900" indent="-342900">
+            <a:pPr marL="342900" indent="-342900" algn="just">
               <a:buFont typeface="Wingdings" panose="05000000000000000000" pitchFamily="2" charset="2"/>
               <a:buChar char="ü"/>
             </a:pPr>
@@ -5553,7 +5554,7 @@
             </a:r>
           </a:p>
           <a:p>
-            <a:pPr marL="342900" indent="-342900">
+            <a:pPr marL="342900" indent="-342900" algn="just">
               <a:buFont typeface="Wingdings" panose="05000000000000000000" pitchFamily="2" charset="2"/>
               <a:buChar char="ü"/>
             </a:pPr>
@@ -5563,7 +5564,7 @@
             </a:endParaRPr>
           </a:p>
           <a:p>
-            <a:pPr marL="342900" indent="-342900">
+            <a:pPr marL="342900" indent="-342900" algn="just">
               <a:buFont typeface="Wingdings" panose="05000000000000000000" pitchFamily="2" charset="2"/>
               <a:buChar char="ü"/>
             </a:pPr>
@@ -5696,7 +5697,7 @@
           </a:bodyPr>
           <a:lstStyle/>
           <a:p>
-            <a:pPr marL="342900" indent="-342900">
+            <a:pPr marL="342900" indent="-342900" algn="just">
               <a:buFont typeface="Wingdings" panose="05000000000000000000" pitchFamily="2" charset="2"/>
               <a:buChar char="ü"/>
             </a:pPr>
@@ -5709,7 +5710,7 @@
             </a:r>
           </a:p>
           <a:p>
-            <a:pPr marL="342900" indent="-342900">
+            <a:pPr marL="342900" indent="-342900" algn="just">
               <a:buFont typeface="Wingdings" panose="05000000000000000000" pitchFamily="2" charset="2"/>
               <a:buChar char="ü"/>
             </a:pPr>
@@ -5719,7 +5720,7 @@
             </a:endParaRPr>
           </a:p>
           <a:p>
-            <a:pPr marL="342900" indent="-342900">
+            <a:pPr marL="342900" indent="-342900" algn="just">
               <a:buFont typeface="Wingdings" panose="05000000000000000000" pitchFamily="2" charset="2"/>
               <a:buChar char="ü"/>
             </a:pPr>
@@ -5732,7 +5733,7 @@
             </a:r>
           </a:p>
           <a:p>
-            <a:pPr marL="342900" indent="-342900">
+            <a:pPr marL="342900" indent="-342900" algn="just">
               <a:buFont typeface="Wingdings" panose="05000000000000000000" pitchFamily="2" charset="2"/>
               <a:buChar char="ü"/>
             </a:pPr>
@@ -5742,7 +5743,7 @@
             </a:endParaRPr>
           </a:p>
           <a:p>
-            <a:pPr marL="342900" indent="-342900">
+            <a:pPr marL="342900" indent="-342900" algn="just">
               <a:buFont typeface="Wingdings" panose="05000000000000000000" pitchFamily="2" charset="2"/>
               <a:buChar char="ü"/>
             </a:pPr>
@@ -5755,7 +5756,7 @@
             </a:r>
           </a:p>
           <a:p>
-            <a:pPr marL="342900" indent="-342900">
+            <a:pPr marL="342900" indent="-342900" algn="just">
               <a:buFont typeface="Wingdings" panose="05000000000000000000" pitchFamily="2" charset="2"/>
               <a:buChar char="ü"/>
             </a:pPr>
@@ -5765,7 +5766,7 @@
             </a:endParaRPr>
           </a:p>
           <a:p>
-            <a:pPr marL="342900" indent="-342900">
+            <a:pPr marL="342900" indent="-342900" algn="just">
               <a:buFont typeface="Wingdings" panose="05000000000000000000" pitchFamily="2" charset="2"/>
               <a:buChar char="ü"/>
             </a:pPr>
@@ -5778,7 +5779,7 @@
             </a:r>
           </a:p>
           <a:p>
-            <a:pPr marL="342900" indent="-342900">
+            <a:pPr marL="342900" indent="-342900" algn="just">
               <a:buFont typeface="Wingdings" panose="05000000000000000000" pitchFamily="2" charset="2"/>
               <a:buChar char="ü"/>
             </a:pPr>
@@ -5788,7 +5789,7 @@
             </a:endParaRPr>
           </a:p>
           <a:p>
-            <a:pPr marL="342900" indent="-342900">
+            <a:pPr marL="342900" indent="-342900" algn="just">
               <a:buFont typeface="Wingdings" panose="05000000000000000000" pitchFamily="2" charset="2"/>
               <a:buChar char="ü"/>
             </a:pPr>
@@ -5901,7 +5902,7 @@
           </a:bodyPr>
           <a:lstStyle/>
           <a:p>
-            <a:pPr marL="342900" indent="-342900">
+            <a:pPr marL="342900" indent="-342900" algn="just">
               <a:buFont typeface="Wingdings" panose="05000000000000000000" pitchFamily="2" charset="2"/>
               <a:buChar char="ü"/>
             </a:pPr>
@@ -5914,7 +5915,7 @@
             </a:r>
           </a:p>
           <a:p>
-            <a:pPr marL="342900" indent="-342900">
+            <a:pPr marL="342900" indent="-342900" algn="just">
               <a:buFont typeface="Wingdings" panose="05000000000000000000" pitchFamily="2" charset="2"/>
               <a:buChar char="ü"/>
             </a:pPr>
@@ -5924,7 +5925,7 @@
             </a:endParaRPr>
           </a:p>
           <a:p>
-            <a:pPr marL="342900" indent="-342900">
+            <a:pPr marL="342900" indent="-342900" algn="just">
               <a:buFont typeface="Wingdings" panose="05000000000000000000" pitchFamily="2" charset="2"/>
               <a:buChar char="ü"/>
             </a:pPr>
@@ -5937,7 +5938,7 @@
             </a:r>
           </a:p>
           <a:p>
-            <a:pPr marL="342900" indent="-342900">
+            <a:pPr marL="342900" indent="-342900" algn="just">
               <a:buFont typeface="Wingdings" panose="05000000000000000000" pitchFamily="2" charset="2"/>
               <a:buChar char="ü"/>
             </a:pPr>
@@ -5947,7 +5948,7 @@
             </a:endParaRPr>
           </a:p>
           <a:p>
-            <a:pPr marL="342900" indent="-342900">
+            <a:pPr marL="342900" indent="-342900" algn="just">
               <a:buFont typeface="Wingdings" panose="05000000000000000000" pitchFamily="2" charset="2"/>
               <a:buChar char="ü"/>
             </a:pPr>
@@ -5960,7 +5961,7 @@
             </a:r>
           </a:p>
           <a:p>
-            <a:pPr marL="342900" indent="-342900">
+            <a:pPr marL="342900" indent="-342900" algn="just">
               <a:buFont typeface="Wingdings" panose="05000000000000000000" pitchFamily="2" charset="2"/>
               <a:buChar char="ü"/>
             </a:pPr>
@@ -5970,7 +5971,7 @@
             </a:endParaRPr>
           </a:p>
           <a:p>
-            <a:pPr marL="342900" indent="-342900">
+            <a:pPr marL="342900" indent="-342900" algn="just">
               <a:buFont typeface="Wingdings" panose="05000000000000000000" pitchFamily="2" charset="2"/>
               <a:buChar char="ü"/>
             </a:pPr>
@@ -6083,7 +6084,7 @@
           </a:bodyPr>
           <a:lstStyle/>
           <a:p>
-            <a:pPr marL="342900" indent="-342900">
+            <a:pPr marL="342900" indent="-342900" algn="just">
               <a:buFont typeface="Wingdings" panose="05000000000000000000" pitchFamily="2" charset="2"/>
               <a:buChar char="Ø"/>
             </a:pPr>
@@ -6096,7 +6097,7 @@
             </a:r>
           </a:p>
           <a:p>
-            <a:pPr marL="342900" indent="-342900">
+            <a:pPr marL="342900" indent="-342900" algn="just">
               <a:buFont typeface="Wingdings" panose="05000000000000000000" pitchFamily="2" charset="2"/>
               <a:buChar char="Ø"/>
             </a:pPr>
@@ -6123,7 +6124,7 @@
             </a:r>
           </a:p>
           <a:p>
-            <a:pPr marL="342900" indent="-342900">
+            <a:pPr marL="342900" indent="-342900" algn="just">
               <a:buFont typeface="Wingdings" panose="05000000000000000000" pitchFamily="2" charset="2"/>
               <a:buChar char="Ø"/>
             </a:pPr>
@@ -6133,7 +6134,7 @@
             </a:endParaRPr>
           </a:p>
           <a:p>
-            <a:pPr marL="342900" indent="-342900">
+            <a:pPr marL="342900" indent="-342900" algn="just">
               <a:buFont typeface="Wingdings" panose="05000000000000000000" pitchFamily="2" charset="2"/>
               <a:buChar char="Ø"/>
             </a:pPr>
@@ -6549,7 +6550,7 @@
           </a:bodyPr>
           <a:lstStyle/>
           <a:p>
-            <a:pPr marL="342900" indent="-342900">
+            <a:pPr marL="342900" indent="-342900" algn="just">
               <a:buFont typeface="Wingdings" panose="05000000000000000000" pitchFamily="2" charset="2"/>
               <a:buChar char="Ø"/>
             </a:pPr>
@@ -6563,7 +6564,7 @@
             </a:r>
           </a:p>
           <a:p>
-            <a:pPr marL="342900" indent="-342900">
+            <a:pPr marL="342900" indent="-342900" algn="just">
               <a:buFont typeface="Wingdings" panose="05000000000000000000" pitchFamily="2" charset="2"/>
               <a:buChar char="Ø"/>
             </a:pPr>
@@ -6574,7 +6575,7 @@
             </a:endParaRPr>
           </a:p>
           <a:p>
-            <a:pPr marL="342900" indent="-342900">
+            <a:pPr marL="342900" indent="-342900" algn="just">
               <a:buFont typeface="Wingdings" panose="05000000000000000000" pitchFamily="2" charset="2"/>
               <a:buChar char="Ø"/>
             </a:pPr>
@@ -6588,7 +6589,7 @@
             </a:r>
           </a:p>
           <a:p>
-            <a:pPr marL="342900" indent="-342900">
+            <a:pPr marL="342900" indent="-342900" algn="just">
               <a:buFont typeface="Wingdings" panose="05000000000000000000" pitchFamily="2" charset="2"/>
               <a:buChar char="Ø"/>
             </a:pPr>
@@ -6599,7 +6600,7 @@
             </a:endParaRPr>
           </a:p>
           <a:p>
-            <a:pPr marL="342900" indent="-342900">
+            <a:pPr marL="342900" indent="-342900" algn="just">
               <a:buFont typeface="Wingdings" panose="05000000000000000000" pitchFamily="2" charset="2"/>
               <a:buChar char="Ø"/>
             </a:pPr>
@@ -6729,7 +6730,7 @@
           </a:bodyPr>
           <a:lstStyle/>
           <a:p>
-            <a:pPr marL="342900" indent="-342900">
+            <a:pPr marL="342900" indent="-342900" algn="just">
               <a:buFont typeface="Wingdings" panose="05000000000000000000" pitchFamily="2" charset="2"/>
               <a:buChar char="Ø"/>
             </a:pPr>
@@ -6756,7 +6757,7 @@
             </a:r>
           </a:p>
           <a:p>
-            <a:pPr marL="342900" indent="-342900">
+            <a:pPr marL="342900" indent="-342900" algn="just">
               <a:buFont typeface="Wingdings" panose="05000000000000000000" pitchFamily="2" charset="2"/>
               <a:buChar char="Ø"/>
             </a:pPr>
@@ -6766,7 +6767,7 @@
             </a:endParaRPr>
           </a:p>
           <a:p>
-            <a:pPr marL="342900" indent="-342900">
+            <a:pPr marL="342900" indent="-342900" algn="just">
               <a:buFont typeface="Wingdings" panose="05000000000000000000" pitchFamily="2" charset="2"/>
               <a:buChar char="Ø"/>
             </a:pPr>
@@ -6793,13 +6794,14 @@
             </a:r>
           </a:p>
           <a:p>
+            <a:pPr algn="just"/>
             <a:endParaRPr lang="en-US" sz="2000" dirty="0">
               <a:latin typeface="Times New Roman" panose="02020603050405020304" pitchFamily="18" charset="0"/>
               <a:cs typeface="Times New Roman" panose="02020603050405020304" pitchFamily="18" charset="0"/>
             </a:endParaRPr>
           </a:p>
           <a:p>
-            <a:pPr marL="342900" indent="-342900">
+            <a:pPr marL="342900" indent="-342900" algn="just">
               <a:buFont typeface="Wingdings" panose="05000000000000000000" pitchFamily="2" charset="2"/>
               <a:buChar char="Ø"/>
             </a:pPr>
@@ -6812,13 +6814,14 @@
             </a:r>
           </a:p>
           <a:p>
+            <a:pPr algn="just"/>
             <a:endParaRPr lang="en-US" sz="2000" dirty="0">
               <a:latin typeface="Times New Roman" panose="02020603050405020304" pitchFamily="18" charset="0"/>
               <a:cs typeface="Times New Roman" panose="02020603050405020304" pitchFamily="18" charset="0"/>
             </a:endParaRPr>
           </a:p>
           <a:p>
-            <a:pPr marL="342900" indent="-342900">
+            <a:pPr marL="342900" indent="-342900" algn="just">
               <a:buFont typeface="Wingdings" panose="05000000000000000000" pitchFamily="2" charset="2"/>
               <a:buChar char="Ø"/>
             </a:pPr>
@@ -6831,7 +6834,7 @@
             </a:r>
           </a:p>
           <a:p>
-            <a:pPr marL="342900" indent="-342900">
+            <a:pPr marL="342900" indent="-342900" algn="just">
               <a:buFont typeface="Wingdings" panose="05000000000000000000" pitchFamily="2" charset="2"/>
               <a:buChar char="Ø"/>
             </a:pPr>
@@ -6841,7 +6844,7 @@
             </a:endParaRPr>
           </a:p>
           <a:p>
-            <a:pPr marL="342900" indent="-342900">
+            <a:pPr marL="342900" indent="-342900" algn="just">
               <a:buFont typeface="Wingdings" panose="05000000000000000000" pitchFamily="2" charset="2"/>
               <a:buChar char="Ø"/>
             </a:pPr>
@@ -6960,7 +6963,7 @@
           </a:bodyPr>
           <a:lstStyle/>
           <a:p>
-            <a:pPr marL="342900" indent="-342900">
+            <a:pPr marL="342900" indent="-342900" algn="just">
               <a:buFont typeface="Wingdings" panose="05000000000000000000" pitchFamily="2" charset="2"/>
               <a:buChar char="Ø"/>
             </a:pPr>
@@ -6973,7 +6976,7 @@
             </a:r>
           </a:p>
           <a:p>
-            <a:pPr marL="342900" indent="-342900">
+            <a:pPr marL="342900" indent="-342900" algn="just">
               <a:buFont typeface="Wingdings" panose="05000000000000000000" pitchFamily="2" charset="2"/>
               <a:buChar char="ü"/>
             </a:pPr>
@@ -6986,7 +6989,7 @@
             </a:r>
           </a:p>
           <a:p>
-            <a:pPr marL="342900" indent="-342900">
+            <a:pPr marL="342900" indent="-342900" algn="just">
               <a:buFont typeface="Wingdings" panose="05000000000000000000" pitchFamily="2" charset="2"/>
               <a:buChar char="ü"/>
             </a:pPr>
@@ -6996,7 +6999,7 @@
             </a:endParaRPr>
           </a:p>
           <a:p>
-            <a:pPr marL="342900" indent="-342900">
+            <a:pPr marL="342900" indent="-342900" algn="just">
               <a:buFont typeface="Wingdings" panose="05000000000000000000" pitchFamily="2" charset="2"/>
               <a:buChar char="ü"/>
             </a:pPr>
@@ -7009,7 +7012,7 @@
             </a:r>
           </a:p>
           <a:p>
-            <a:pPr marL="342900" indent="-342900">
+            <a:pPr marL="342900" indent="-342900" algn="just">
               <a:buFont typeface="Wingdings" panose="05000000000000000000" pitchFamily="2" charset="2"/>
               <a:buChar char="ü"/>
             </a:pPr>
@@ -7019,7 +7022,7 @@
             </a:endParaRPr>
           </a:p>
           <a:p>
-            <a:pPr marL="342900" indent="-342900">
+            <a:pPr marL="342900" indent="-342900" algn="just">
               <a:buFont typeface="Wingdings" panose="05000000000000000000" pitchFamily="2" charset="2"/>
               <a:buChar char="ü"/>
             </a:pPr>
@@ -7032,7 +7035,7 @@
             </a:r>
           </a:p>
           <a:p>
-            <a:pPr marL="342900" indent="-342900">
+            <a:pPr marL="342900" indent="-342900" algn="just">
               <a:buFont typeface="Wingdings" panose="05000000000000000000" pitchFamily="2" charset="2"/>
               <a:buChar char="ü"/>
             </a:pPr>
@@ -7042,7 +7045,7 @@
             </a:endParaRPr>
           </a:p>
           <a:p>
-            <a:pPr marL="342900" indent="-342900">
+            <a:pPr marL="342900" indent="-342900" algn="just">
               <a:buFont typeface="Wingdings" panose="05000000000000000000" pitchFamily="2" charset="2"/>
               <a:buChar char="ü"/>
             </a:pPr>
@@ -7055,7 +7058,7 @@
             </a:r>
           </a:p>
           <a:p>
-            <a:pPr marL="342900" indent="-342900">
+            <a:pPr marL="342900" indent="-342900" algn="just">
               <a:buFont typeface="Wingdings" panose="05000000000000000000" pitchFamily="2" charset="2"/>
               <a:buChar char="ü"/>
             </a:pPr>
@@ -7065,7 +7068,7 @@
             </a:endParaRPr>
           </a:p>
           <a:p>
-            <a:pPr marL="342900" indent="-342900">
+            <a:pPr marL="342900" indent="-342900" algn="just">
               <a:buFont typeface="Wingdings" panose="05000000000000000000" pitchFamily="2" charset="2"/>
               <a:buChar char="ü"/>
             </a:pPr>
@@ -7691,7 +7694,7 @@
           </a:bodyPr>
           <a:lstStyle/>
           <a:p>
-            <a:pPr marL="342900" indent="-342900">
+            <a:pPr marL="342900" indent="-342900" algn="just">
               <a:buFont typeface="Wingdings" panose="05000000000000000000" pitchFamily="2" charset="2"/>
               <a:buChar char="Ø"/>
             </a:pPr>
@@ -7704,7 +7707,7 @@
             </a:r>
           </a:p>
           <a:p>
-            <a:pPr marL="342900" indent="-342900">
+            <a:pPr marL="342900" indent="-342900" algn="just">
               <a:buFont typeface="Wingdings" panose="05000000000000000000" pitchFamily="2" charset="2"/>
               <a:buChar char="ü"/>
             </a:pPr>
@@ -7745,7 +7748,7 @@
             </a:r>
           </a:p>
           <a:p>
-            <a:pPr marL="342900" indent="-342900">
+            <a:pPr marL="342900" indent="-342900" algn="just">
               <a:buFont typeface="Wingdings" panose="05000000000000000000" pitchFamily="2" charset="2"/>
               <a:buChar char="ü"/>
             </a:pPr>
@@ -7755,7 +7758,7 @@
             </a:endParaRPr>
           </a:p>
           <a:p>
-            <a:pPr marL="342900" indent="-342900">
+            <a:pPr marL="342900" indent="-342900" algn="just">
               <a:buFont typeface="Wingdings" panose="05000000000000000000" pitchFamily="2" charset="2"/>
               <a:buChar char="ü"/>
             </a:pPr>
@@ -7768,13 +7771,14 @@
             </a:r>
           </a:p>
           <a:p>
+            <a:pPr algn="just"/>
             <a:endParaRPr lang="en-US" sz="2000" b="1" dirty="0">
               <a:latin typeface="Times New Roman" panose="02020603050405020304" pitchFamily="18" charset="0"/>
               <a:cs typeface="Times New Roman" panose="02020603050405020304" pitchFamily="18" charset="0"/>
             </a:endParaRPr>
           </a:p>
           <a:p>
-            <a:pPr marL="342900" indent="-342900">
+            <a:pPr marL="342900" indent="-342900" algn="just">
               <a:buFont typeface="Wingdings" panose="05000000000000000000" pitchFamily="2" charset="2"/>
               <a:buChar char="Ø"/>
             </a:pPr>
@@ -7787,7 +7791,7 @@
             </a:r>
           </a:p>
           <a:p>
-            <a:pPr marL="342900" indent="-342900">
+            <a:pPr marL="342900" indent="-342900" algn="just">
               <a:buFont typeface="Wingdings" panose="05000000000000000000" pitchFamily="2" charset="2"/>
               <a:buChar char="ü"/>
             </a:pPr>
@@ -7800,7 +7804,7 @@
             </a:r>
           </a:p>
           <a:p>
-            <a:pPr marL="342900" indent="-342900">
+            <a:pPr marL="342900" indent="-342900" algn="just">
               <a:buFont typeface="Wingdings" panose="05000000000000000000" pitchFamily="2" charset="2"/>
               <a:buChar char="ü"/>
             </a:pPr>
@@ -7810,7 +7814,7 @@
             </a:endParaRPr>
           </a:p>
           <a:p>
-            <a:pPr marL="342900" indent="-342900">
+            <a:pPr marL="342900" indent="-342900" algn="just">
               <a:buFont typeface="Wingdings" panose="05000000000000000000" pitchFamily="2" charset="2"/>
               <a:buChar char="ü"/>
             </a:pPr>

</xml_diff>